<commit_message>
fix nunit version on slides
</commit_message>
<xml_diff>
--- a/Testing.pptx
+++ b/Testing.pptx
@@ -3288,7 +3288,7 @@
           <a:p>
             <a:fld id="{16E5F246-0B7D-44DF-8C1B-EDFCA5DA626A}" type="datetimeFigureOut">
               <a:rPr lang="ru-RU" smtClean="0"/>
-              <a:t>28.04.2015</a:t>
+              <a:t>01.05.2015</a:t>
             </a:fld>
             <a:endParaRPr lang="ru-RU"/>
           </a:p>
@@ -4485,7 +4485,7 @@
           <a:p>
             <a:fld id="{ED7A5A9E-355E-4F5A-82F5-195339D13266}" type="datetimeFigureOut">
               <a:rPr lang="ru-RU" smtClean="0"/>
-              <a:t>28.04.2015</a:t>
+              <a:t>01.05.2015</a:t>
             </a:fld>
             <a:endParaRPr lang="ru-RU"/>
           </a:p>
@@ -4655,7 +4655,7 @@
           <a:p>
             <a:fld id="{ED7A5A9E-355E-4F5A-82F5-195339D13266}" type="datetimeFigureOut">
               <a:rPr lang="ru-RU" smtClean="0"/>
-              <a:t>28.04.2015</a:t>
+              <a:t>01.05.2015</a:t>
             </a:fld>
             <a:endParaRPr lang="ru-RU"/>
           </a:p>
@@ -4835,7 +4835,7 @@
           <a:p>
             <a:fld id="{ED7A5A9E-355E-4F5A-82F5-195339D13266}" type="datetimeFigureOut">
               <a:rPr lang="ru-RU" smtClean="0"/>
-              <a:t>28.04.2015</a:t>
+              <a:t>01.05.2015</a:t>
             </a:fld>
             <a:endParaRPr lang="ru-RU"/>
           </a:p>
@@ -5005,7 +5005,7 @@
           <a:p>
             <a:fld id="{ED7A5A9E-355E-4F5A-82F5-195339D13266}" type="datetimeFigureOut">
               <a:rPr lang="ru-RU" smtClean="0"/>
-              <a:t>28.04.2015</a:t>
+              <a:t>01.05.2015</a:t>
             </a:fld>
             <a:endParaRPr lang="ru-RU"/>
           </a:p>
@@ -5251,7 +5251,7 @@
           <a:p>
             <a:fld id="{ED7A5A9E-355E-4F5A-82F5-195339D13266}" type="datetimeFigureOut">
               <a:rPr lang="ru-RU" smtClean="0"/>
-              <a:t>28.04.2015</a:t>
+              <a:t>01.05.2015</a:t>
             </a:fld>
             <a:endParaRPr lang="ru-RU"/>
           </a:p>
@@ -5539,7 +5539,7 @@
           <a:p>
             <a:fld id="{ED7A5A9E-355E-4F5A-82F5-195339D13266}" type="datetimeFigureOut">
               <a:rPr lang="ru-RU" smtClean="0"/>
-              <a:t>28.04.2015</a:t>
+              <a:t>01.05.2015</a:t>
             </a:fld>
             <a:endParaRPr lang="ru-RU"/>
           </a:p>
@@ -5961,7 +5961,7 @@
           <a:p>
             <a:fld id="{ED7A5A9E-355E-4F5A-82F5-195339D13266}" type="datetimeFigureOut">
               <a:rPr lang="ru-RU" smtClean="0"/>
-              <a:t>28.04.2015</a:t>
+              <a:t>01.05.2015</a:t>
             </a:fld>
             <a:endParaRPr lang="ru-RU"/>
           </a:p>
@@ -6079,7 +6079,7 @@
           <a:p>
             <a:fld id="{ED7A5A9E-355E-4F5A-82F5-195339D13266}" type="datetimeFigureOut">
               <a:rPr lang="ru-RU" smtClean="0"/>
-              <a:t>28.04.2015</a:t>
+              <a:t>01.05.2015</a:t>
             </a:fld>
             <a:endParaRPr lang="ru-RU"/>
           </a:p>
@@ -6174,7 +6174,7 @@
           <a:p>
             <a:fld id="{ED7A5A9E-355E-4F5A-82F5-195339D13266}" type="datetimeFigureOut">
               <a:rPr lang="ru-RU" smtClean="0"/>
-              <a:t>28.04.2015</a:t>
+              <a:t>01.05.2015</a:t>
             </a:fld>
             <a:endParaRPr lang="ru-RU"/>
           </a:p>
@@ -6451,7 +6451,7 @@
           <a:p>
             <a:fld id="{ED7A5A9E-355E-4F5A-82F5-195339D13266}" type="datetimeFigureOut">
               <a:rPr lang="ru-RU" smtClean="0"/>
-              <a:t>28.04.2015</a:t>
+              <a:t>01.05.2015</a:t>
             </a:fld>
             <a:endParaRPr lang="ru-RU"/>
           </a:p>
@@ -6704,7 +6704,7 @@
           <a:p>
             <a:fld id="{ED7A5A9E-355E-4F5A-82F5-195339D13266}" type="datetimeFigureOut">
               <a:rPr lang="ru-RU" smtClean="0"/>
-              <a:t>28.04.2015</a:t>
+              <a:t>01.05.2015</a:t>
             </a:fld>
             <a:endParaRPr lang="ru-RU"/>
           </a:p>
@@ -6917,7 +6917,7 @@
           <a:p>
             <a:fld id="{ED7A5A9E-355E-4F5A-82F5-195339D13266}" type="datetimeFigureOut">
               <a:rPr lang="ru-RU" smtClean="0"/>
-              <a:t>28.04.2015</a:t>
+              <a:t>01.05.2015</a:t>
             </a:fld>
             <a:endParaRPr lang="ru-RU"/>
           </a:p>
@@ -10473,6 +10473,13 @@
   <p:clrMapOvr>
     <a:masterClrMapping/>
   </p:clrMapOvr>
+  <p:timing>
+    <p:tnLst>
+      <p:par>
+        <p:cTn id="1" dur="indefinite" restart="never" nodeType="tmRoot"/>
+      </p:par>
+    </p:tnLst>
+  </p:timing>
 </p:sld>
 </file>
 
@@ -10964,13 +10971,8 @@
             <a:pPr eaLnBrk="1" hangingPunct="1"/>
             <a:r>
               <a:rPr lang="en-US" altLang="ru-RU" dirty="0" smtClean="0"/>
-              <a:t>Scoring </a:t>
-            </a:r>
-            <a:r>
-              <a:rPr lang="en-US" altLang="ru-RU" dirty="0" smtClean="0"/>
-              <a:t>Bowling</a:t>
-            </a:r>
-            <a:endParaRPr lang="en-US" altLang="ru-RU" dirty="0" smtClean="0"/>
+              <a:t>Scoring Bowling</a:t>
+            </a:r>
           </a:p>
         </p:txBody>
       </p:sp>
@@ -10992,7 +10994,7 @@
           <a:graphicData uri="http://schemas.openxmlformats.org/presentationml/2006/ole">
             <mc:AlternateContent xmlns:mc="http://schemas.openxmlformats.org/markup-compatibility/2006">
               <mc:Choice xmlns:v="urn:schemas-microsoft-com:vml" Requires="v">
-                <p:oleObj spid="_x0000_s1027" name="VISIO" r:id="rId4" imgW="2544803" imgH="251238" progId="Visio.Drawing.5">
+                <p:oleObj spid="_x0000_s1028" name="VISIO" r:id="rId4" imgW="2544803" imgH="251238" progId="Visio.Drawing.5">
                   <p:embed/>
                 </p:oleObj>
               </mc:Choice>
@@ -11359,6 +11361,13 @@
   <p:clrMapOvr>
     <a:masterClrMapping/>
   </p:clrMapOvr>
+  <p:timing>
+    <p:tnLst>
+      <p:par>
+        <p:cTn id="1" dur="indefinite" restart="never" nodeType="tmRoot"/>
+      </p:par>
+    </p:tnLst>
+  </p:timing>
 </p:sld>
 </file>
 
@@ -11399,7 +11408,6 @@
               <a:rPr lang="en-US" altLang="ru-RU" dirty="0" smtClean="0"/>
               <a:t>Design</a:t>
             </a:r>
-            <a:endParaRPr lang="en-US" altLang="ru-RU" dirty="0" smtClean="0"/>
           </a:p>
         </p:txBody>
       </p:sp>
@@ -11450,14 +11458,7 @@
                 <a:latin typeface="Consolas" panose="020B0609020204030204" pitchFamily="49" charset="0"/>
                 <a:cs typeface="Consolas" panose="020B0609020204030204" pitchFamily="49" charset="0"/>
               </a:rPr>
-              <a:t>void </a:t>
-            </a:r>
-            <a:r>
-              <a:rPr lang="en-US" altLang="ru-RU" dirty="0" smtClean="0">
-                <a:latin typeface="Consolas" panose="020B0609020204030204" pitchFamily="49" charset="0"/>
-                <a:cs typeface="Consolas" panose="020B0609020204030204" pitchFamily="49" charset="0"/>
-              </a:rPr>
-              <a:t>Roll(</a:t>
+              <a:t>void Roll(</a:t>
             </a:r>
             <a:r>
               <a:rPr lang="en-US" altLang="ru-RU" dirty="0" err="1" smtClean="0">
@@ -11525,10 +11526,6 @@
               </a:rPr>
               <a:t>}</a:t>
             </a:r>
-            <a:endParaRPr lang="en-US" altLang="ru-RU" dirty="0" smtClean="0">
-              <a:latin typeface="Consolas" panose="020B0609020204030204" pitchFamily="49" charset="0"/>
-              <a:cs typeface="Consolas" panose="020B0609020204030204" pitchFamily="49" charset="0"/>
-            </a:endParaRPr>
           </a:p>
         </p:txBody>
       </p:sp>
@@ -11542,6 +11539,13 @@
   <p:clrMapOvr>
     <a:masterClrMapping/>
   </p:clrMapOvr>
+  <p:timing>
+    <p:tnLst>
+      <p:par>
+        <p:cTn id="1" dur="indefinite" restart="never" nodeType="tmRoot"/>
+      </p:par>
+    </p:tnLst>
+  </p:timing>
 </p:sld>
 </file>
 
@@ -11806,7 +11810,11 @@
               <a:rPr lang="en-US" sz="2400" dirty="0" smtClean="0">
                 <a:hlinkClick r:id="rId2"/>
               </a:rPr>
-              <a:t>/index.php?p=docHome&amp;r=2.6.3</a:t>
+              <a:t>/index.php?p=docHome&amp;r=2.6.4</a:t>
+            </a:r>
+            <a:r>
+              <a:rPr lang="en-US" sz="2400" dirty="0" smtClean="0"/>
+              <a:t> </a:t>
             </a:r>
             <a:endParaRPr lang="ru-RU" sz="2400" dirty="0"/>
           </a:p>

</xml_diff>